<commit_message>
tilføjer mine to spørgsmål :p
</commit_message>
<xml_diff>
--- a/Powerpoint/RIP_group2.pptx
+++ b/Powerpoint/RIP_group2.pptx
@@ -5,10 +5,10 @@
     <p:sldMasterId id="2147483648" r:id="rId1"/>
   </p:sldMasterIdLst>
   <p:notesMasterIdLst>
-    <p:notesMasterId r:id="rId11"/>
+    <p:notesMasterId r:id="rId12"/>
   </p:notesMasterIdLst>
   <p:handoutMasterIdLst>
-    <p:handoutMasterId r:id="rId12"/>
+    <p:handoutMasterId r:id="rId13"/>
   </p:handoutMasterIdLst>
   <p:sldIdLst>
     <p:sldId id="261" r:id="rId2"/>
@@ -18,44 +18,45 @@
     <p:sldId id="272" r:id="rId6"/>
     <p:sldId id="269" r:id="rId7"/>
     <p:sldId id="270" r:id="rId8"/>
-    <p:sldId id="271" r:id="rId9"/>
-    <p:sldId id="260" r:id="rId10"/>
+    <p:sldId id="273" r:id="rId9"/>
+    <p:sldId id="271" r:id="rId10"/>
+    <p:sldId id="260" r:id="rId11"/>
   </p:sldIdLst>
   <p:sldSz cx="12188825" cy="6858000"/>
   <p:notesSz cx="6797675" cy="9926638"/>
   <p:embeddedFontLst>
     <p:embeddedFont>
+      <p:font typeface="AU Passata" panose="020B0604020202020204" charset="0"/>
+      <p:regular r:id="rId14"/>
+      <p:bold r:id="rId15"/>
+    </p:embeddedFont>
+    <p:embeddedFont>
+      <p:font typeface="AU Passata Light" panose="020B0604020202020204" charset="0"/>
+      <p:regular r:id="rId16"/>
+      <p:bold r:id="rId17"/>
+    </p:embeddedFont>
+    <p:embeddedFont>
+      <p:font typeface="AU Peto" panose="020B0604020202020204" charset="0"/>
+      <p:regular r:id="rId18"/>
+      <p:bold r:id="rId19"/>
+    </p:embeddedFont>
+    <p:embeddedFont>
       <p:font typeface="Calibri" panose="020F0502020204030204" pitchFamily="34" charset="0"/>
-      <p:regular r:id="rId13"/>
-      <p:bold r:id="rId14"/>
-      <p:italic r:id="rId15"/>
-      <p:boldItalic r:id="rId16"/>
+      <p:regular r:id="rId20"/>
+      <p:bold r:id="rId21"/>
+      <p:italic r:id="rId22"/>
+      <p:boldItalic r:id="rId23"/>
     </p:embeddedFont>
     <p:embeddedFont>
       <p:font typeface="Georgia" panose="02040502050405020303" pitchFamily="18" charset="0"/>
-      <p:regular r:id="rId17"/>
-      <p:bold r:id="rId18"/>
-      <p:italic r:id="rId19"/>
-      <p:boldItalic r:id="rId20"/>
+      <p:regular r:id="rId24"/>
+      <p:bold r:id="rId25"/>
+      <p:italic r:id="rId26"/>
+      <p:boldItalic r:id="rId27"/>
     </p:embeddedFont>
     <p:embeddedFont>
       <p:font typeface="Wingdings 3" panose="05040102010807070707" pitchFamily="18" charset="2"/>
-      <p:regular r:id="rId21"/>
-    </p:embeddedFont>
-    <p:embeddedFont>
-      <p:font typeface="AU Peto" panose="020B0604020202020204" charset="0"/>
-      <p:regular r:id="rId22"/>
-      <p:bold r:id="rId23"/>
-    </p:embeddedFont>
-    <p:embeddedFont>
-      <p:font typeface="AU Passata Light" panose="020B0604020202020204" charset="0"/>
-      <p:regular r:id="rId24"/>
-      <p:bold r:id="rId25"/>
-    </p:embeddedFont>
-    <p:embeddedFont>
-      <p:font typeface="AU Passata" panose="020B0604020202020204" charset="0"/>
-      <p:regular r:id="rId26"/>
-      <p:bold r:id="rId27"/>
+      <p:regular r:id="rId28"/>
     </p:embeddedFont>
   </p:embeddedFontLst>
   <p:defaultTextStyle>
@@ -225,10 +226,6 @@
 </p:presentation>
 </file>
 
-<file path=ppt/revisionInfo.xml><?xml version="1.0" encoding="utf-8"?>
-<p1510:revInfo xmlns:a="http://schemas.openxmlformats.org/drawingml/2006/main" xmlns:r="http://schemas.openxmlformats.org/officeDocument/2006/relationships" xmlns:p1510="http://schemas.microsoft.com/office/powerpoint/2015/10/main"/>
-</file>
-
 <file path=ppt/handoutMasters/handoutMaster1.xml><?xml version="1.0" encoding="utf-8"?>
 <p:handoutMaster xmlns:a="http://schemas.openxmlformats.org/drawingml/2006/main" xmlns:r="http://schemas.openxmlformats.org/officeDocument/2006/relationships" xmlns:p="http://schemas.openxmlformats.org/presentationml/2006/main">
   <p:cSld>
@@ -459,7 +456,7 @@
               <a:pPr>
                 <a:defRPr/>
               </a:pPr>
-              <a:t>‹#›</a:t>
+              <a:t>‹nr.›</a:t>
             </a:fld>
             <a:endParaRPr lang="en-GB" dirty="0"/>
           </a:p>
@@ -806,7 +803,7 @@
               <a:pPr>
                 <a:defRPr/>
               </a:pPr>
-              <a:t>‹#›</a:t>
+              <a:t>‹nr.›</a:t>
             </a:fld>
             <a:endParaRPr lang="en-GB" dirty="0"/>
           </a:p>
@@ -1016,7 +1013,7 @@
               <a:pPr>
                 <a:defRPr/>
               </a:pPr>
-              <a:t>9</a:t>
+              <a:t>10</a:t>
             </a:fld>
             <a:endParaRPr lang="en-GB" dirty="0"/>
           </a:p>
@@ -1618,7 +1615,7 @@
               <a:pPr>
                 <a:defRPr/>
               </a:pPr>
-              <a:t>‹#›</a:t>
+              <a:t>‹nr.›</a:t>
             </a:fld>
             <a:endParaRPr lang="da-DK" dirty="0"/>
           </a:p>
@@ -1642,7 +1639,7 @@
             <a:fld id="{78417F83-4CBA-48F2-BAD0-783AE3701E32}" type="datetimeFigureOut">
               <a:rPr lang="da-DK" smtClean="0"/>
               <a:pPr/>
-              <a:t>03-10-2018</a:t>
+              <a:t>04-10-2018</a:t>
             </a:fld>
             <a:r>
               <a:rPr lang="da-DK" dirty="0"/>
@@ -1828,7 +1825,7 @@
               <a:pPr>
                 <a:defRPr/>
               </a:pPr>
-              <a:t>‹#›</a:t>
+              <a:t>‹nr.›</a:t>
             </a:fld>
             <a:endParaRPr lang="da-DK" dirty="0"/>
           </a:p>
@@ -1852,7 +1849,7 @@
             <a:fld id="{78417F83-4CBA-48F2-BAD0-783AE3701E32}" type="datetimeFigureOut">
               <a:rPr lang="da-DK" smtClean="0"/>
               <a:pPr/>
-              <a:t>03-10-2018</a:t>
+              <a:t>04-10-2018</a:t>
             </a:fld>
             <a:r>
               <a:rPr lang="da-DK" dirty="0"/>
@@ -2069,7 +2066,7 @@
               <a:pPr>
                 <a:defRPr/>
               </a:pPr>
-              <a:t>‹#›</a:t>
+              <a:t>‹nr.›</a:t>
             </a:fld>
             <a:endParaRPr lang="da-DK" dirty="0"/>
           </a:p>
@@ -2093,7 +2090,7 @@
             <a:fld id="{78417F83-4CBA-48F2-BAD0-783AE3701E32}" type="datetimeFigureOut">
               <a:rPr lang="da-DK" smtClean="0"/>
               <a:pPr/>
-              <a:t>03-10-2018</a:t>
+              <a:t>04-10-2018</a:t>
             </a:fld>
             <a:r>
               <a:rPr lang="da-DK" dirty="0"/>
@@ -2239,7 +2236,7 @@
               <a:pPr>
                 <a:defRPr/>
               </a:pPr>
-              <a:t>‹#›</a:t>
+              <a:t>‹nr.›</a:t>
             </a:fld>
             <a:endParaRPr lang="da-DK" dirty="0"/>
           </a:p>
@@ -2263,7 +2260,7 @@
             <a:fld id="{78417F83-4CBA-48F2-BAD0-783AE3701E32}" type="datetimeFigureOut">
               <a:rPr lang="da-DK" smtClean="0"/>
               <a:pPr/>
-              <a:t>03-10-2018</a:t>
+              <a:t>04-10-2018</a:t>
             </a:fld>
             <a:r>
               <a:rPr lang="da-DK" dirty="0"/>
@@ -2413,7 +2410,7 @@
               <a:pPr>
                 <a:defRPr/>
               </a:pPr>
-              <a:t>‹#›</a:t>
+              <a:t>‹nr.›</a:t>
             </a:fld>
             <a:endParaRPr lang="da-DK" dirty="0"/>
           </a:p>
@@ -2437,7 +2434,7 @@
             <a:fld id="{78417F83-4CBA-48F2-BAD0-783AE3701E32}" type="datetimeFigureOut">
               <a:rPr lang="da-DK" smtClean="0"/>
               <a:pPr/>
-              <a:t>03-10-2018</a:t>
+              <a:t>04-10-2018</a:t>
             </a:fld>
             <a:r>
               <a:rPr lang="da-DK" dirty="0"/>
@@ -2750,7 +2747,7 @@
               <a:pPr>
                 <a:defRPr/>
               </a:pPr>
-              <a:t>‹#›</a:t>
+              <a:t>‹nr.›</a:t>
             </a:fld>
             <a:endParaRPr lang="da-DK" dirty="0"/>
           </a:p>
@@ -2774,7 +2771,7 @@
             <a:fld id="{78417F83-4CBA-48F2-BAD0-783AE3701E32}" type="datetimeFigureOut">
               <a:rPr lang="da-DK" smtClean="0"/>
               <a:pPr/>
-              <a:t>03-10-2018</a:t>
+              <a:t>04-10-2018</a:t>
             </a:fld>
             <a:r>
               <a:rPr lang="da-DK" dirty="0"/>
@@ -2921,7 +2918,7 @@
               <a:pPr>
                 <a:defRPr/>
               </a:pPr>
-              <a:t>‹#›</a:t>
+              <a:t>‹nr.›</a:t>
             </a:fld>
             <a:endParaRPr lang="da-DK" dirty="0"/>
           </a:p>
@@ -2945,7 +2942,7 @@
             <a:fld id="{78417F83-4CBA-48F2-BAD0-783AE3701E32}" type="datetimeFigureOut">
               <a:rPr lang="da-DK" smtClean="0"/>
               <a:pPr/>
-              <a:t>03-10-2018</a:t>
+              <a:t>04-10-2018</a:t>
             </a:fld>
             <a:r>
               <a:rPr lang="da-DK" dirty="0"/>
@@ -3117,7 +3114,7 @@
               <a:pPr>
                 <a:defRPr/>
               </a:pPr>
-              <a:t>‹#›</a:t>
+              <a:t>‹nr.›</a:t>
             </a:fld>
             <a:endParaRPr lang="da-DK" dirty="0"/>
           </a:p>
@@ -3141,7 +3138,7 @@
             <a:fld id="{78417F83-4CBA-48F2-BAD0-783AE3701E32}" type="datetimeFigureOut">
               <a:rPr lang="da-DK" smtClean="0"/>
               <a:pPr/>
-              <a:t>03-10-2018</a:t>
+              <a:t>04-10-2018</a:t>
             </a:fld>
             <a:r>
               <a:rPr lang="da-DK" dirty="0"/>
@@ -3286,7 +3283,7 @@
               <a:pPr>
                 <a:defRPr/>
               </a:pPr>
-              <a:t>‹#›</a:t>
+              <a:t>‹nr.›</a:t>
             </a:fld>
             <a:endParaRPr lang="da-DK" dirty="0"/>
           </a:p>
@@ -3310,7 +3307,7 @@
             <a:fld id="{78417F83-4CBA-48F2-BAD0-783AE3701E32}" type="datetimeFigureOut">
               <a:rPr lang="da-DK" smtClean="0"/>
               <a:pPr/>
-              <a:t>03-10-2018</a:t>
+              <a:t>04-10-2018</a:t>
             </a:fld>
             <a:r>
               <a:rPr lang="da-DK" dirty="0"/>
@@ -3464,7 +3461,7 @@
             <a:fld id="{78417F83-4CBA-48F2-BAD0-783AE3701E32}" type="datetimeFigureOut">
               <a:rPr lang="da-DK" smtClean="0"/>
               <a:pPr/>
-              <a:t>03-10-2018</a:t>
+              <a:t>04-10-2018</a:t>
             </a:fld>
             <a:r>
               <a:rPr lang="da-DK" dirty="0"/>
@@ -3526,7 +3523,7 @@
               <a:pPr>
                 <a:defRPr/>
               </a:pPr>
-              <a:t>‹#›</a:t>
+              <a:t>‹nr.›</a:t>
             </a:fld>
             <a:endParaRPr lang="da-DK" dirty="0"/>
           </a:p>
@@ -4353,7 +4350,7 @@
             <a:fld id="{78417F83-4CBA-48F2-BAD0-783AE3701E32}" type="datetimeFigureOut">
               <a:rPr lang="da-DK" smtClean="0"/>
               <a:pPr/>
-              <a:t>03-10-2018</a:t>
+              <a:t>04-10-2018</a:t>
             </a:fld>
             <a:r>
               <a:rPr lang="da-DK" dirty="0"/>
@@ -4420,7 +4417,7 @@
               <a:pPr>
                 <a:defRPr/>
               </a:pPr>
-              <a:t>‹#›</a:t>
+              <a:t>‹nr.›</a:t>
             </a:fld>
             <a:endParaRPr lang="da-DK" dirty="0"/>
           </a:p>
@@ -5144,7 +5141,7 @@
               <a:pPr>
                 <a:defRPr/>
               </a:pPr>
-              <a:t>‹#›</a:t>
+              <a:t>‹nr.›</a:t>
             </a:fld>
             <a:endParaRPr lang="da-DK" dirty="0"/>
           </a:p>
@@ -5168,7 +5165,7 @@
             <a:fld id="{78417F83-4CBA-48F2-BAD0-783AE3701E32}" type="datetimeFigureOut">
               <a:rPr lang="da-DK" smtClean="0"/>
               <a:pPr/>
-              <a:t>03-10-2018</a:t>
+              <a:t>04-10-2018</a:t>
             </a:fld>
             <a:r>
               <a:rPr lang="da-DK" dirty="0"/>
@@ -5398,7 +5395,7 @@
             <a:fld id="{78417F83-4CBA-48F2-BAD0-783AE3701E32}" type="datetimeFigureOut">
               <a:rPr lang="da-DK" smtClean="0"/>
               <a:pPr/>
-              <a:t>03-10-2018</a:t>
+              <a:t>04-10-2018</a:t>
             </a:fld>
             <a:r>
               <a:rPr lang="da-DK" dirty="0"/>
@@ -5465,7 +5462,7 @@
               <a:pPr>
                 <a:defRPr/>
               </a:pPr>
-              <a:t>‹#›</a:t>
+              <a:t>‹nr.›</a:t>
             </a:fld>
             <a:endParaRPr lang="da-DK" dirty="0"/>
           </a:p>
@@ -6079,7 +6076,7 @@
               <a:pPr>
                 <a:defRPr/>
               </a:pPr>
-              <a:t>‹#›</a:t>
+              <a:t>‹nr.›</a:t>
             </a:fld>
             <a:endParaRPr lang="da-DK" dirty="0"/>
           </a:p>
@@ -6103,7 +6100,7 @@
             <a:fld id="{78417F83-4CBA-48F2-BAD0-783AE3701E32}" type="datetimeFigureOut">
               <a:rPr lang="da-DK" smtClean="0"/>
               <a:pPr/>
-              <a:t>03-10-2018</a:t>
+              <a:t>04-10-2018</a:t>
             </a:fld>
             <a:r>
               <a:rPr lang="da-DK" dirty="0"/>
@@ -6370,7 +6367,7 @@
               <a:pPr>
                 <a:defRPr/>
               </a:pPr>
-              <a:t>‹#›</a:t>
+              <a:t>‹nr.›</a:t>
             </a:fld>
             <a:endParaRPr lang="da-DK" dirty="0"/>
           </a:p>
@@ -6394,7 +6391,7 @@
             <a:fld id="{78417F83-4CBA-48F2-BAD0-783AE3701E32}" type="datetimeFigureOut">
               <a:rPr lang="da-DK" smtClean="0"/>
               <a:pPr/>
-              <a:t>03-10-2018</a:t>
+              <a:t>04-10-2018</a:t>
             </a:fld>
             <a:r>
               <a:rPr lang="da-DK" dirty="0"/>
@@ -6744,7 +6741,7 @@
               <a:pPr>
                 <a:defRPr/>
               </a:pPr>
-              <a:t>‹#›</a:t>
+              <a:t>‹nr.›</a:t>
             </a:fld>
             <a:endParaRPr lang="da-DK" dirty="0"/>
           </a:p>
@@ -6768,7 +6765,7 @@
             <a:fld id="{78417F83-4CBA-48F2-BAD0-783AE3701E32}" type="datetimeFigureOut">
               <a:rPr lang="da-DK" smtClean="0"/>
               <a:pPr/>
-              <a:t>03-10-2018</a:t>
+              <a:t>04-10-2018</a:t>
             </a:fld>
             <a:r>
               <a:rPr lang="da-DK" dirty="0"/>
@@ -7171,7 +7168,7 @@
               <a:pPr>
                 <a:defRPr/>
               </a:pPr>
-              <a:t>‹#›</a:t>
+              <a:t>‹nr.›</a:t>
             </a:fld>
             <a:endParaRPr lang="da-DK" dirty="0"/>
           </a:p>
@@ -7195,7 +7192,7 @@
             <a:fld id="{78417F83-4CBA-48F2-BAD0-783AE3701E32}" type="datetimeFigureOut">
               <a:rPr lang="da-DK" smtClean="0"/>
               <a:pPr/>
-              <a:t>03-10-2018</a:t>
+              <a:t>04-10-2018</a:t>
             </a:fld>
             <a:r>
               <a:rPr lang="da-DK" dirty="0"/>
@@ -7611,7 +7608,7 @@
               <a:pPr>
                 <a:defRPr/>
               </a:pPr>
-              <a:t>‹#›</a:t>
+              <a:t>‹nr.›</a:t>
             </a:fld>
             <a:endParaRPr lang="da-DK" dirty="0"/>
           </a:p>
@@ -7635,7 +7632,7 @@
             <a:fld id="{78417F83-4CBA-48F2-BAD0-783AE3701E32}" type="datetimeFigureOut">
               <a:rPr lang="da-DK" smtClean="0"/>
               <a:pPr/>
-              <a:t>03-10-2018</a:t>
+              <a:t>04-10-2018</a:t>
             </a:fld>
             <a:r>
               <a:rPr lang="da-DK" dirty="0"/>
@@ -7779,7 +7776,7 @@
               <a:pPr>
                 <a:defRPr/>
               </a:pPr>
-              <a:t>‹#›</a:t>
+              <a:t>‹nr.›</a:t>
             </a:fld>
             <a:endParaRPr lang="da-DK" dirty="0"/>
           </a:p>
@@ -7803,7 +7800,7 @@
             <a:fld id="{78417F83-4CBA-48F2-BAD0-783AE3701E32}" type="datetimeFigureOut">
               <a:rPr lang="da-DK" smtClean="0"/>
               <a:pPr/>
-              <a:t>03-10-2018</a:t>
+              <a:t>04-10-2018</a:t>
             </a:fld>
             <a:r>
               <a:rPr lang="da-DK" dirty="0"/>
@@ -7960,7 +7957,7 @@
               <a:pPr>
                 <a:defRPr/>
               </a:pPr>
-              <a:t>‹#›</a:t>
+              <a:t>‹nr.›</a:t>
             </a:fld>
             <a:endParaRPr lang="da-DK" dirty="0"/>
           </a:p>
@@ -7984,7 +7981,7 @@
             <a:fld id="{78417F83-4CBA-48F2-BAD0-783AE3701E32}" type="datetimeFigureOut">
               <a:rPr lang="da-DK" smtClean="0"/>
               <a:pPr/>
-              <a:t>03-10-2018</a:t>
+              <a:t>04-10-2018</a:t>
             </a:fld>
             <a:r>
               <a:rPr lang="da-DK" dirty="0"/>
@@ -8717,7 +8714,7 @@
               <a:pPr>
                 <a:defRPr/>
               </a:pPr>
-              <a:t>‹#›</a:t>
+              <a:t>‹nr.›</a:t>
             </a:fld>
             <a:endParaRPr lang="da-DK" dirty="0"/>
           </a:p>
@@ -8755,7 +8752,7 @@
             <a:fld id="{78417F83-4CBA-48F2-BAD0-783AE3701E32}" type="datetimeFigureOut">
               <a:rPr lang="da-DK" smtClean="0"/>
               <a:pPr/>
-              <a:t>03-10-2018</a:t>
+              <a:t>04-10-2018</a:t>
             </a:fld>
             <a:r>
               <a:rPr lang="da-DK"/>
@@ -9393,6 +9390,39 @@
 </p:sld>
 </file>
 
+<file path=ppt/slides/slide10.xml><?xml version="1.0" encoding="utf-8"?>
+<p:sld xmlns:a="http://schemas.openxmlformats.org/drawingml/2006/main" xmlns:r="http://schemas.openxmlformats.org/officeDocument/2006/relationships" xmlns:p="http://schemas.openxmlformats.org/presentationml/2006/main">
+  <p:cSld>
+    <p:spTree>
+      <p:nvGrpSpPr>
+        <p:cNvPr id="1" name=""/>
+        <p:cNvGrpSpPr/>
+        <p:nvPr/>
+      </p:nvGrpSpPr>
+      <p:grpSpPr>
+        <a:xfrm>
+          <a:off x="0" y="0"/>
+          <a:ext cx="0" cy="0"/>
+          <a:chOff x="0" y="0"/>
+          <a:chExt cx="0" cy="0"/>
+        </a:xfrm>
+      </p:grpSpPr>
+    </p:spTree>
+    <p:custDataLst>
+      <p:tags r:id="rId1"/>
+    </p:custDataLst>
+    <p:extLst>
+      <p:ext uri="{BB962C8B-B14F-4D97-AF65-F5344CB8AC3E}">
+        <p14:creationId xmlns:p14="http://schemas.microsoft.com/office/powerpoint/2010/main" val="2139698179"/>
+      </p:ext>
+    </p:extLst>
+  </p:cSld>
+  <p:clrMapOvr>
+    <a:masterClrMapping/>
+  </p:clrMapOvr>
+</p:sld>
+</file>
+
 <file path=ppt/slides/slide2.xml><?xml version="1.0" encoding="utf-8"?>
 <p:sld xmlns:a="http://schemas.openxmlformats.org/drawingml/2006/main" xmlns:r="http://schemas.openxmlformats.org/officeDocument/2006/relationships" xmlns:p="http://schemas.openxmlformats.org/presentationml/2006/main">
   <p:cSld>
@@ -9888,12 +9918,62 @@
             <p:ph idx="1"/>
           </p:nvPr>
         </p:nvSpPr>
-        <p:spPr/>
+        <p:spPr>
+          <a:xfrm>
+            <a:off x="985838" y="1960079"/>
+            <a:ext cx="10220325" cy="3937484"/>
+          </a:xfrm>
+        </p:spPr>
         <p:txBody>
           <a:bodyPr/>
           <a:lstStyle/>
           <a:p>
-            <a:endParaRPr lang="da-DK" dirty="0"/>
+            <a:pPr marL="342900" indent="-342900">
+              <a:buFont typeface="Arial" panose="020B0604020202020204" pitchFamily="34" charset="0"/>
+              <a:buChar char="•"/>
+            </a:pPr>
+            <a:r>
+              <a:rPr lang="en-US" dirty="0"/>
+              <a:t>Whenever a router changes the metric for a route, its required to send update messages almost immediately </a:t>
+            </a:r>
+          </a:p>
+          <a:p>
+            <a:pPr marL="342900" indent="-342900">
+              <a:buFont typeface="Arial" panose="020B0604020202020204" pitchFamily="34" charset="0"/>
+              <a:buChar char="•"/>
+            </a:pPr>
+            <a:r>
+              <a:rPr lang="en-US" dirty="0"/>
+              <a:t>Update goes out to all its neighbors</a:t>
+            </a:r>
+          </a:p>
+          <a:p>
+            <a:pPr marL="342900" indent="-342900">
+              <a:buFont typeface="Arial" panose="020B0604020202020204" pitchFamily="34" charset="0"/>
+              <a:buChar char="•"/>
+            </a:pPr>
+            <a:r>
+              <a:rPr lang="da-DK" dirty="0"/>
+              <a:t>O</a:t>
+            </a:r>
+            <a:r>
+              <a:rPr lang="en-US" dirty="0" err="1"/>
+              <a:t>nly</a:t>
+            </a:r>
+            <a:r>
+              <a:rPr lang="en-US" dirty="0"/>
+              <a:t> neighbors who are effected by the update will use it, others will ignore it</a:t>
+            </a:r>
+          </a:p>
+          <a:p>
+            <a:pPr marL="342900" indent="-342900">
+              <a:buFont typeface="Arial" panose="020B0604020202020204" pitchFamily="34" charset="0"/>
+              <a:buChar char="•"/>
+            </a:pPr>
+            <a:r>
+              <a:rPr lang="en-US" dirty="0"/>
+              <a:t>However regular updates and trigged updates can interfere if trigged updates don’t happen quick enough</a:t>
+            </a:r>
           </a:p>
         </p:txBody>
       </p:sp>
@@ -9953,14 +10033,6 @@
               <a:rPr lang="da-DK" sz="3600" dirty="0" err="1"/>
               <a:t>specification</a:t>
             </a:r>
-            <a:r>
-              <a:rPr lang="da-DK" sz="3600" dirty="0"/>
-              <a:t> and </a:t>
-            </a:r>
-            <a:r>
-              <a:rPr lang="da-DK" sz="3600" dirty="0" err="1"/>
-              <a:t>messages</a:t>
-            </a:r>
             <a:endParaRPr lang="da-DK" sz="3600" dirty="0"/>
           </a:p>
         </p:txBody>
@@ -9975,12 +10047,80 @@
             <p:ph idx="1"/>
           </p:nvPr>
         </p:nvSpPr>
-        <p:spPr/>
+        <p:spPr>
+          <a:xfrm>
+            <a:off x="765820" y="1960079"/>
+            <a:ext cx="10440343" cy="3937484"/>
+          </a:xfrm>
+        </p:spPr>
         <p:txBody>
           <a:bodyPr/>
           <a:lstStyle/>
           <a:p>
-            <a:endParaRPr lang="da-DK" dirty="0"/>
+            <a:pPr marL="342900" indent="-342900">
+              <a:buFont typeface="Arial" panose="020B0604020202020204" pitchFamily="34" charset="0"/>
+              <a:buChar char="•"/>
+            </a:pPr>
+            <a:r>
+              <a:rPr lang="en-US" dirty="0"/>
+              <a:t>Each entry for every destination that is reachable in a rip operating system consist at least:</a:t>
+            </a:r>
+          </a:p>
+          <a:p>
+            <a:pPr marL="342900" indent="-342900">
+              <a:buFontTx/>
+              <a:buChar char="-"/>
+            </a:pPr>
+            <a:r>
+              <a:rPr lang="en-US" dirty="0"/>
+              <a:t>The IPv4 address of the destination </a:t>
+            </a:r>
+          </a:p>
+          <a:p>
+            <a:pPr marL="342900" indent="-342900">
+              <a:buFontTx/>
+              <a:buChar char="-"/>
+            </a:pPr>
+            <a:r>
+              <a:rPr lang="en-US" dirty="0"/>
+              <a:t>A metric</a:t>
+            </a:r>
+          </a:p>
+          <a:p>
+            <a:pPr marL="342900" indent="-342900">
+              <a:buFontTx/>
+              <a:buChar char="-"/>
+            </a:pPr>
+            <a:r>
+              <a:rPr lang="en-US" dirty="0"/>
+              <a:t>The IPv4 address of the next destination (next hop) </a:t>
+            </a:r>
+          </a:p>
+          <a:p>
+            <a:pPr marL="342900" indent="-342900">
+              <a:buFontTx/>
+              <a:buChar char="-"/>
+            </a:pPr>
+            <a:r>
+              <a:rPr lang="en-US" dirty="0"/>
+              <a:t>A flag (if information about the route has changed)</a:t>
+            </a:r>
+          </a:p>
+          <a:p>
+            <a:pPr marL="342900" indent="-342900">
+              <a:buFontTx/>
+              <a:buChar char="-"/>
+            </a:pPr>
+            <a:r>
+              <a:rPr lang="en-US" dirty="0"/>
+              <a:t>Various timers associated with the route</a:t>
+            </a:r>
+          </a:p>
+          <a:p>
+            <a:pPr>
+              <a:buNone/>
+            </a:pPr>
+            <a:endParaRPr lang="en-US" dirty="0"/>
           </a:p>
         </p:txBody>
       </p:sp>
@@ -10019,7 +10159,13 @@
       </p:grpSpPr>
       <p:sp>
         <p:nvSpPr>
-          <p:cNvPr id="3" name="Title 2"/>
+          <p:cNvPr id="2" name="Titel 1">
+            <a:extLst>
+              <a:ext uri="{FF2B5EF4-FFF2-40B4-BE49-F238E27FC236}">
+                <a16:creationId xmlns:a16="http://schemas.microsoft.com/office/drawing/2014/main" id="{730BEE2D-EE30-4F76-88F2-8DAC058EB734}"/>
+              </a:ext>
+            </a:extLst>
+          </p:cNvPr>
           <p:cNvSpPr>
             <a:spLocks noGrp="1"/>
           </p:cNvSpPr>
@@ -10033,48 +10179,97 @@
           <a:lstStyle/>
           <a:p>
             <a:r>
-              <a:rPr lang="da-DK" sz="3600" dirty="0" err="1"/>
-              <a:t>Considerations</a:t>
-            </a:r>
-            <a:r>
-              <a:rPr lang="da-DK" sz="3600" dirty="0"/>
-              <a:t>:</a:t>
-            </a:r>
-            <a:br>
-              <a:rPr lang="da-DK" sz="3600" dirty="0"/>
-            </a:br>
-            <a:r>
-              <a:rPr lang="da-DK" sz="3600" dirty="0" err="1"/>
-              <a:t>Auth</a:t>
-            </a:r>
-            <a:r>
-              <a:rPr lang="da-DK" sz="3600" dirty="0"/>
-              <a:t>. And </a:t>
-            </a:r>
-            <a:r>
-              <a:rPr lang="da-DK" sz="3600" dirty="0" err="1"/>
-              <a:t>security</a:t>
-            </a:r>
-            <a:r>
-              <a:rPr lang="da-DK" sz="3600" dirty="0"/>
+              <a:rPr lang="da-DK" sz="4800" dirty="0"/>
+              <a:t>messages</a:t>
+            </a:r>
+            <a:endParaRPr lang="en-US" dirty="0"/>
+          </a:p>
+        </p:txBody>
+      </p:sp>
+      <p:sp>
+        <p:nvSpPr>
+          <p:cNvPr id="3" name="Pladsholder til indhold 2">
+            <a:extLst>
+              <a:ext uri="{FF2B5EF4-FFF2-40B4-BE49-F238E27FC236}">
+                <a16:creationId xmlns:a16="http://schemas.microsoft.com/office/drawing/2014/main" id="{AB22A32E-7CFD-488C-8760-DEEE52E6A91C}"/>
+              </a:ext>
+            </a:extLst>
+          </p:cNvPr>
+          <p:cNvSpPr>
+            <a:spLocks noGrp="1"/>
+          </p:cNvSpPr>
+          <p:nvPr>
+            <p:ph idx="1"/>
+          </p:nvPr>
+        </p:nvSpPr>
+        <p:spPr/>
+        <p:txBody>
+          <a:bodyPr/>
+          <a:lstStyle/>
+          <a:p>
+            <a:pPr marL="342900" indent="-342900">
+              <a:buFont typeface="Arial" panose="020B0604020202020204" pitchFamily="34" charset="0"/>
+              <a:buChar char="•"/>
+            </a:pPr>
+            <a:r>
+              <a:rPr lang="da-DK" dirty="0"/>
+              <a:t>RIP is a UDP-</a:t>
+            </a:r>
+            <a:r>
+              <a:rPr lang="da-DK" dirty="0" err="1"/>
+              <a:t>based</a:t>
+            </a:r>
+            <a:r>
+              <a:rPr lang="da-DK" dirty="0"/>
               <a:t> </a:t>
             </a:r>
             <a:r>
-              <a:rPr lang="da-DK" sz="3600" dirty="0" err="1"/>
-              <a:t>message</a:t>
-            </a:r>
-            <a:endParaRPr lang="da-DK" sz="3600" dirty="0"/>
-          </a:p>
-        </p:txBody>
-      </p:sp>
-      <p:sp>
-        <p:nvSpPr>
-          <p:cNvPr id="5" name="Content Placeholder 4"/>
+              <a:rPr lang="da-DK" dirty="0" err="1"/>
+              <a:t>protocol</a:t>
+            </a:r>
+            <a:endParaRPr lang="da-DK" dirty="0"/>
+          </a:p>
+          <a:p>
+            <a:pPr marL="342900" indent="-342900">
+              <a:buFont typeface="Arial" panose="020B0604020202020204" pitchFamily="34" charset="0"/>
+              <a:buChar char="•"/>
+            </a:pPr>
+            <a:r>
+              <a:rPr lang="da-DK" dirty="0"/>
+              <a:t>RIP </a:t>
+            </a:r>
+            <a:r>
+              <a:rPr lang="da-DK" dirty="0" err="1"/>
+              <a:t>packet</a:t>
+            </a:r>
+            <a:r>
+              <a:rPr lang="da-DK" dirty="0"/>
+              <a:t> format is:</a:t>
+            </a:r>
+          </a:p>
+          <a:p>
+            <a:pPr marL="342900" indent="-342900">
+              <a:buFont typeface="Arial" panose="020B0604020202020204" pitchFamily="34" charset="0"/>
+              <a:buChar char="•"/>
+            </a:pPr>
+            <a:endParaRPr lang="en-US" dirty="0"/>
+          </a:p>
+        </p:txBody>
+      </p:sp>
+      <p:sp>
+        <p:nvSpPr>
+          <p:cNvPr id="4" name="Pladsholder til dato 3">
+            <a:extLst>
+              <a:ext uri="{FF2B5EF4-FFF2-40B4-BE49-F238E27FC236}">
+                <a16:creationId xmlns:a16="http://schemas.microsoft.com/office/drawing/2014/main" id="{411A42B3-FB04-47AC-8617-8A2071BCF8F5}"/>
+              </a:ext>
+            </a:extLst>
+          </p:cNvPr>
           <p:cNvSpPr>
             <a:spLocks noGrp="1"/>
           </p:cNvSpPr>
           <p:nvPr>
-            <p:ph idx="1"/>
+            <p:ph type="dt" sz="half" idx="10"/>
           </p:nvPr>
         </p:nvSpPr>
         <p:spPr/>
@@ -10082,17 +10277,52 @@
           <a:bodyPr/>
           <a:lstStyle/>
           <a:p>
+            <a:fld id="{4E971463-9D11-49C6-990F-A7A6F49DDE03}" type="datetime1">
+              <a:rPr lang="da-DK" smtClean="0"/>
+              <a:t>04-10-2018</a:t>
+            </a:fld>
+            <a:r>
+              <a:rPr lang="da-DK"/>
+              <a:t>03-10-2018</a:t>
+            </a:r>
             <a:endParaRPr lang="da-DK" dirty="0"/>
           </a:p>
         </p:txBody>
       </p:sp>
+      <p:pic>
+        <p:nvPicPr>
+          <p:cNvPr id="5" name="Billede 4">
+            <a:extLst>
+              <a:ext uri="{FF2B5EF4-FFF2-40B4-BE49-F238E27FC236}">
+                <a16:creationId xmlns:a16="http://schemas.microsoft.com/office/drawing/2014/main" id="{790217EB-D947-497E-885A-7469F0DD19EB}"/>
+              </a:ext>
+            </a:extLst>
+          </p:cNvPr>
+          <p:cNvPicPr>
+            <a:picLocks noChangeAspect="1"/>
+          </p:cNvPicPr>
+          <p:nvPr/>
+        </p:nvPicPr>
+        <p:blipFill>
+          <a:blip r:embed="rId2"/>
+          <a:stretch>
+            <a:fillRect/>
+          </a:stretch>
+        </p:blipFill>
+        <p:spPr>
+          <a:xfrm>
+            <a:off x="4006180" y="2420888"/>
+            <a:ext cx="5848350" cy="2514600"/>
+          </a:xfrm>
+          <a:prstGeom prst="rect">
+            <a:avLst/>
+          </a:prstGeom>
+        </p:spPr>
+      </p:pic>
     </p:spTree>
-    <p:custDataLst>
-      <p:tags r:id="rId1"/>
-    </p:custDataLst>
     <p:extLst>
       <p:ext uri="{BB962C8B-B14F-4D97-AF65-F5344CB8AC3E}">
-        <p14:creationId xmlns:p14="http://schemas.microsoft.com/office/powerpoint/2010/main" val="2012856361"/>
+        <p14:creationId xmlns:p14="http://schemas.microsoft.com/office/powerpoint/2010/main" val="1293647646"/>
       </p:ext>
     </p:extLst>
   </p:cSld>
@@ -10119,13 +10349,82 @@
           <a:chExt cx="0" cy="0"/>
         </a:xfrm>
       </p:grpSpPr>
+      <p:sp>
+        <p:nvSpPr>
+          <p:cNvPr id="3" name="Title 2"/>
+          <p:cNvSpPr>
+            <a:spLocks noGrp="1"/>
+          </p:cNvSpPr>
+          <p:nvPr>
+            <p:ph type="title"/>
+          </p:nvPr>
+        </p:nvSpPr>
+        <p:spPr/>
+        <p:txBody>
+          <a:bodyPr/>
+          <a:lstStyle/>
+          <a:p>
+            <a:r>
+              <a:rPr lang="da-DK" sz="3600" dirty="0" err="1"/>
+              <a:t>Considerations</a:t>
+            </a:r>
+            <a:r>
+              <a:rPr lang="da-DK" sz="3600" dirty="0"/>
+              <a:t>:</a:t>
+            </a:r>
+            <a:br>
+              <a:rPr lang="da-DK" sz="3600" dirty="0"/>
+            </a:br>
+            <a:r>
+              <a:rPr lang="da-DK" sz="3600" dirty="0" err="1"/>
+              <a:t>Auth</a:t>
+            </a:r>
+            <a:r>
+              <a:rPr lang="da-DK" sz="3600" dirty="0"/>
+              <a:t>. And </a:t>
+            </a:r>
+            <a:r>
+              <a:rPr lang="da-DK" sz="3600" dirty="0" err="1"/>
+              <a:t>security</a:t>
+            </a:r>
+            <a:r>
+              <a:rPr lang="da-DK" sz="3600" dirty="0"/>
+              <a:t> </a:t>
+            </a:r>
+            <a:r>
+              <a:rPr lang="da-DK" sz="3600" dirty="0" err="1"/>
+              <a:t>message</a:t>
+            </a:r>
+            <a:endParaRPr lang="da-DK" sz="3600" dirty="0"/>
+          </a:p>
+        </p:txBody>
+      </p:sp>
+      <p:sp>
+        <p:nvSpPr>
+          <p:cNvPr id="5" name="Content Placeholder 4"/>
+          <p:cNvSpPr>
+            <a:spLocks noGrp="1"/>
+          </p:cNvSpPr>
+          <p:nvPr>
+            <p:ph idx="1"/>
+          </p:nvPr>
+        </p:nvSpPr>
+        <p:spPr/>
+        <p:txBody>
+          <a:bodyPr/>
+          <a:lstStyle/>
+          <a:p>
+            <a:endParaRPr lang="da-DK" dirty="0"/>
+          </a:p>
+        </p:txBody>
+      </p:sp>
     </p:spTree>
     <p:custDataLst>
       <p:tags r:id="rId1"/>
     </p:custDataLst>
     <p:extLst>
       <p:ext uri="{BB962C8B-B14F-4D97-AF65-F5344CB8AC3E}">
-        <p14:creationId xmlns:p14="http://schemas.microsoft.com/office/powerpoint/2010/main" val="2139698179"/>
+        <p14:creationId xmlns:p14="http://schemas.microsoft.com/office/powerpoint/2010/main" val="2012856361"/>
       </p:ext>
     </p:extLst>
   </p:cSld>

</xml_diff>

<commit_message>
Tilføjer min del til powerpoint
</commit_message>
<xml_diff>
--- a/Powerpoint/RIP_group2.pptx
+++ b/Powerpoint/RIP_group2.pptx
@@ -26,37 +26,37 @@
   <p:notesSz cx="6797675" cy="9926638"/>
   <p:embeddedFontLst>
     <p:embeddedFont>
-      <p:font typeface="AU Passata" panose="020B0604020202020204" charset="0"/>
+      <p:font typeface="Wingdings 3" panose="05040102010807070707" pitchFamily="18" charset="2"/>
       <p:regular r:id="rId14"/>
-      <p:bold r:id="rId15"/>
+    </p:embeddedFont>
+    <p:embeddedFont>
+      <p:font typeface="Calibri" panose="020F0502020204030204" pitchFamily="34" charset="0"/>
+      <p:regular r:id="rId15"/>
+      <p:bold r:id="rId16"/>
+      <p:italic r:id="rId17"/>
+      <p:boldItalic r:id="rId18"/>
+    </p:embeddedFont>
+    <p:embeddedFont>
+      <p:font typeface="Georgia" panose="02040502050405020303" pitchFamily="18" charset="0"/>
+      <p:regular r:id="rId19"/>
+      <p:bold r:id="rId20"/>
+      <p:italic r:id="rId21"/>
+      <p:boldItalic r:id="rId22"/>
+    </p:embeddedFont>
+    <p:embeddedFont>
+      <p:font typeface="AU Peto" panose="020B0604020202020204" charset="0"/>
+      <p:regular r:id="rId23"/>
+      <p:bold r:id="rId24"/>
     </p:embeddedFont>
     <p:embeddedFont>
       <p:font typeface="AU Passata Light" panose="020B0604020202020204" charset="0"/>
-      <p:regular r:id="rId16"/>
-      <p:bold r:id="rId17"/>
+      <p:regular r:id="rId25"/>
+      <p:bold r:id="rId26"/>
     </p:embeddedFont>
     <p:embeddedFont>
-      <p:font typeface="AU Peto" panose="020B0604020202020204" charset="0"/>
-      <p:regular r:id="rId18"/>
-      <p:bold r:id="rId19"/>
-    </p:embeddedFont>
-    <p:embeddedFont>
-      <p:font typeface="Calibri" panose="020F0502020204030204" pitchFamily="34" charset="0"/>
-      <p:regular r:id="rId20"/>
-      <p:bold r:id="rId21"/>
-      <p:italic r:id="rId22"/>
-      <p:boldItalic r:id="rId23"/>
-    </p:embeddedFont>
-    <p:embeddedFont>
-      <p:font typeface="Georgia" panose="02040502050405020303" pitchFamily="18" charset="0"/>
-      <p:regular r:id="rId24"/>
-      <p:bold r:id="rId25"/>
-      <p:italic r:id="rId26"/>
-      <p:boldItalic r:id="rId27"/>
-    </p:embeddedFont>
-    <p:embeddedFont>
-      <p:font typeface="Wingdings 3" panose="05040102010807070707" pitchFamily="18" charset="2"/>
-      <p:regular r:id="rId28"/>
+      <p:font typeface="AU Passata" panose="020B0604020202020204" charset="0"/>
+      <p:regular r:id="rId27"/>
+      <p:bold r:id="rId28"/>
     </p:embeddedFont>
   </p:embeddedFontLst>
   <p:defaultTextStyle>
@@ -1639,7 +1639,7 @@
             <a:fld id="{78417F83-4CBA-48F2-BAD0-783AE3701E32}" type="datetimeFigureOut">
               <a:rPr lang="da-DK" smtClean="0"/>
               <a:pPr/>
-              <a:t>04-10-2018</a:t>
+              <a:t>05-10-2018</a:t>
             </a:fld>
             <a:r>
               <a:rPr lang="da-DK" dirty="0"/>
@@ -1849,7 +1849,7 @@
             <a:fld id="{78417F83-4CBA-48F2-BAD0-783AE3701E32}" type="datetimeFigureOut">
               <a:rPr lang="da-DK" smtClean="0"/>
               <a:pPr/>
-              <a:t>04-10-2018</a:t>
+              <a:t>05-10-2018</a:t>
             </a:fld>
             <a:r>
               <a:rPr lang="da-DK" dirty="0"/>
@@ -2090,7 +2090,7 @@
             <a:fld id="{78417F83-4CBA-48F2-BAD0-783AE3701E32}" type="datetimeFigureOut">
               <a:rPr lang="da-DK" smtClean="0"/>
               <a:pPr/>
-              <a:t>04-10-2018</a:t>
+              <a:t>05-10-2018</a:t>
             </a:fld>
             <a:r>
               <a:rPr lang="da-DK" dirty="0"/>
@@ -2260,7 +2260,7 @@
             <a:fld id="{78417F83-4CBA-48F2-BAD0-783AE3701E32}" type="datetimeFigureOut">
               <a:rPr lang="da-DK" smtClean="0"/>
               <a:pPr/>
-              <a:t>04-10-2018</a:t>
+              <a:t>05-10-2018</a:t>
             </a:fld>
             <a:r>
               <a:rPr lang="da-DK" dirty="0"/>
@@ -2434,7 +2434,7 @@
             <a:fld id="{78417F83-4CBA-48F2-BAD0-783AE3701E32}" type="datetimeFigureOut">
               <a:rPr lang="da-DK" smtClean="0"/>
               <a:pPr/>
-              <a:t>04-10-2018</a:t>
+              <a:t>05-10-2018</a:t>
             </a:fld>
             <a:r>
               <a:rPr lang="da-DK" dirty="0"/>
@@ -2771,7 +2771,7 @@
             <a:fld id="{78417F83-4CBA-48F2-BAD0-783AE3701E32}" type="datetimeFigureOut">
               <a:rPr lang="da-DK" smtClean="0"/>
               <a:pPr/>
-              <a:t>04-10-2018</a:t>
+              <a:t>05-10-2018</a:t>
             </a:fld>
             <a:r>
               <a:rPr lang="da-DK" dirty="0"/>
@@ -2942,7 +2942,7 @@
             <a:fld id="{78417F83-4CBA-48F2-BAD0-783AE3701E32}" type="datetimeFigureOut">
               <a:rPr lang="da-DK" smtClean="0"/>
               <a:pPr/>
-              <a:t>04-10-2018</a:t>
+              <a:t>05-10-2018</a:t>
             </a:fld>
             <a:r>
               <a:rPr lang="da-DK" dirty="0"/>
@@ -3138,7 +3138,7 @@
             <a:fld id="{78417F83-4CBA-48F2-BAD0-783AE3701E32}" type="datetimeFigureOut">
               <a:rPr lang="da-DK" smtClean="0"/>
               <a:pPr/>
-              <a:t>04-10-2018</a:t>
+              <a:t>05-10-2018</a:t>
             </a:fld>
             <a:r>
               <a:rPr lang="da-DK" dirty="0"/>
@@ -3307,7 +3307,7 @@
             <a:fld id="{78417F83-4CBA-48F2-BAD0-783AE3701E32}" type="datetimeFigureOut">
               <a:rPr lang="da-DK" smtClean="0"/>
               <a:pPr/>
-              <a:t>04-10-2018</a:t>
+              <a:t>05-10-2018</a:t>
             </a:fld>
             <a:r>
               <a:rPr lang="da-DK" dirty="0"/>
@@ -3461,7 +3461,7 @@
             <a:fld id="{78417F83-4CBA-48F2-BAD0-783AE3701E32}" type="datetimeFigureOut">
               <a:rPr lang="da-DK" smtClean="0"/>
               <a:pPr/>
-              <a:t>04-10-2018</a:t>
+              <a:t>05-10-2018</a:t>
             </a:fld>
             <a:r>
               <a:rPr lang="da-DK" dirty="0"/>
@@ -4350,7 +4350,7 @@
             <a:fld id="{78417F83-4CBA-48F2-BAD0-783AE3701E32}" type="datetimeFigureOut">
               <a:rPr lang="da-DK" smtClean="0"/>
               <a:pPr/>
-              <a:t>04-10-2018</a:t>
+              <a:t>05-10-2018</a:t>
             </a:fld>
             <a:r>
               <a:rPr lang="da-DK" dirty="0"/>
@@ -5165,7 +5165,7 @@
             <a:fld id="{78417F83-4CBA-48F2-BAD0-783AE3701E32}" type="datetimeFigureOut">
               <a:rPr lang="da-DK" smtClean="0"/>
               <a:pPr/>
-              <a:t>04-10-2018</a:t>
+              <a:t>05-10-2018</a:t>
             </a:fld>
             <a:r>
               <a:rPr lang="da-DK" dirty="0"/>
@@ -5395,7 +5395,7 @@
             <a:fld id="{78417F83-4CBA-48F2-BAD0-783AE3701E32}" type="datetimeFigureOut">
               <a:rPr lang="da-DK" smtClean="0"/>
               <a:pPr/>
-              <a:t>04-10-2018</a:t>
+              <a:t>05-10-2018</a:t>
             </a:fld>
             <a:r>
               <a:rPr lang="da-DK" dirty="0"/>
@@ -6100,7 +6100,7 @@
             <a:fld id="{78417F83-4CBA-48F2-BAD0-783AE3701E32}" type="datetimeFigureOut">
               <a:rPr lang="da-DK" smtClean="0"/>
               <a:pPr/>
-              <a:t>04-10-2018</a:t>
+              <a:t>05-10-2018</a:t>
             </a:fld>
             <a:r>
               <a:rPr lang="da-DK" dirty="0"/>
@@ -6391,7 +6391,7 @@
             <a:fld id="{78417F83-4CBA-48F2-BAD0-783AE3701E32}" type="datetimeFigureOut">
               <a:rPr lang="da-DK" smtClean="0"/>
               <a:pPr/>
-              <a:t>04-10-2018</a:t>
+              <a:t>05-10-2018</a:t>
             </a:fld>
             <a:r>
               <a:rPr lang="da-DK" dirty="0"/>
@@ -6765,7 +6765,7 @@
             <a:fld id="{78417F83-4CBA-48F2-BAD0-783AE3701E32}" type="datetimeFigureOut">
               <a:rPr lang="da-DK" smtClean="0"/>
               <a:pPr/>
-              <a:t>04-10-2018</a:t>
+              <a:t>05-10-2018</a:t>
             </a:fld>
             <a:r>
               <a:rPr lang="da-DK" dirty="0"/>
@@ -7192,7 +7192,7 @@
             <a:fld id="{78417F83-4CBA-48F2-BAD0-783AE3701E32}" type="datetimeFigureOut">
               <a:rPr lang="da-DK" smtClean="0"/>
               <a:pPr/>
-              <a:t>04-10-2018</a:t>
+              <a:t>05-10-2018</a:t>
             </a:fld>
             <a:r>
               <a:rPr lang="da-DK" dirty="0"/>
@@ -7632,7 +7632,7 @@
             <a:fld id="{78417F83-4CBA-48F2-BAD0-783AE3701E32}" type="datetimeFigureOut">
               <a:rPr lang="da-DK" smtClean="0"/>
               <a:pPr/>
-              <a:t>04-10-2018</a:t>
+              <a:t>05-10-2018</a:t>
             </a:fld>
             <a:r>
               <a:rPr lang="da-DK" dirty="0"/>
@@ -7800,7 +7800,7 @@
             <a:fld id="{78417F83-4CBA-48F2-BAD0-783AE3701E32}" type="datetimeFigureOut">
               <a:rPr lang="da-DK" smtClean="0"/>
               <a:pPr/>
-              <a:t>04-10-2018</a:t>
+              <a:t>05-10-2018</a:t>
             </a:fld>
             <a:r>
               <a:rPr lang="da-DK" dirty="0"/>
@@ -7981,7 +7981,7 @@
             <a:fld id="{78417F83-4CBA-48F2-BAD0-783AE3701E32}" type="datetimeFigureOut">
               <a:rPr lang="da-DK" smtClean="0"/>
               <a:pPr/>
-              <a:t>04-10-2018</a:t>
+              <a:t>05-10-2018</a:t>
             </a:fld>
             <a:r>
               <a:rPr lang="da-DK" dirty="0"/>
@@ -8752,7 +8752,7 @@
             <a:fld id="{78417F83-4CBA-48F2-BAD0-783AE3701E32}" type="datetimeFigureOut">
               <a:rPr lang="da-DK" smtClean="0"/>
               <a:pPr/>
-              <a:t>04-10-2018</a:t>
+              <a:t>05-10-2018</a:t>
             </a:fld>
             <a:r>
               <a:rPr lang="da-DK"/>
@@ -9485,15 +9485,663 @@
             <p:ph idx="1"/>
           </p:nvPr>
         </p:nvSpPr>
-        <p:spPr/>
+        <p:spPr>
+          <a:xfrm>
+            <a:off x="985839" y="1960078"/>
+            <a:ext cx="3812430" cy="4277233"/>
+          </a:xfrm>
+        </p:spPr>
         <p:txBody>
           <a:bodyPr/>
           <a:lstStyle/>
           <a:p>
-            <a:endParaRPr lang="da-DK" dirty="0"/>
-          </a:p>
-        </p:txBody>
-      </p:sp>
+            <a:r>
+              <a:rPr lang="en-US" sz="1400" dirty="0"/>
+              <a:t>•the distance vector algorithm (Bellman Ford)</a:t>
+            </a:r>
+          </a:p>
+          <a:p>
+            <a:r>
+              <a:rPr lang="en-US" sz="1400" dirty="0"/>
+              <a:t>•The idea is to find the least cost path between two nodes.</a:t>
+            </a:r>
+          </a:p>
+          <a:p>
+            <a:r>
+              <a:rPr lang="en-US" sz="1400" dirty="0"/>
+              <a:t>•Each nodes sends its distance information vector to each adjacent node.</a:t>
+            </a:r>
+          </a:p>
+          <a:p>
+            <a:r>
+              <a:rPr lang="en-US" sz="1400" dirty="0"/>
+              <a:t>•Ex node X at the beginning of the network will have a distance vector looking like:</a:t>
+            </a:r>
+          </a:p>
+          <a:p>
+            <a:endParaRPr lang="en-US" sz="1400" dirty="0"/>
+          </a:p>
+          <a:p>
+            <a:endParaRPr lang="en-US" sz="1400" dirty="0"/>
+          </a:p>
+          <a:p>
+            <a:endParaRPr lang="en-US" sz="1400" dirty="0"/>
+          </a:p>
+          <a:p>
+            <a:pPr>
+              <a:buNone/>
+            </a:pPr>
+            <a:r>
+              <a:rPr lang="en-US" sz="1400" dirty="0"/>
+              <a:t>•Even though the path to Z is shorter going through Y, X doesn’t know that yet. </a:t>
+            </a:r>
+          </a:p>
+          <a:p>
+            <a:r>
+              <a:rPr lang="en-US" sz="1400" dirty="0"/>
+              <a:t>•When each node has received its adjacent nodes vector, it can update its routing table and us e the shortest path.</a:t>
+            </a:r>
+          </a:p>
+          <a:p>
+            <a:endParaRPr lang="da-DK" sz="1400" dirty="0"/>
+          </a:p>
+        </p:txBody>
+      </p:sp>
+      <p:pic>
+        <p:nvPicPr>
+          <p:cNvPr id="4" name="Billede 3">
+            <a:extLst>
+              <a:ext uri="{FF2B5EF4-FFF2-40B4-BE49-F238E27FC236}">
+                <a16:creationId xmlns:a16="http://schemas.microsoft.com/office/drawing/2014/main" id="{E94F26FE-C8E6-4FF7-8F04-BD9E3636B1EC}"/>
+              </a:ext>
+            </a:extLst>
+          </p:cNvPr>
+          <p:cNvPicPr/>
+          <p:nvPr/>
+        </p:nvPicPr>
+        <p:blipFill>
+          <a:blip r:embed="rId3" cstate="print">
+            <a:extLst>
+              <a:ext uri="{28A0092B-C50C-407E-A947-70E740481C1C}">
+                <a14:useLocalDpi xmlns:a14="http://schemas.microsoft.com/office/drawing/2010/main" val="0"/>
+              </a:ext>
+            </a:extLst>
+          </a:blip>
+          <a:srcRect/>
+          <a:stretch>
+            <a:fillRect/>
+          </a:stretch>
+        </p:blipFill>
+        <p:spPr bwMode="auto">
+          <a:xfrm>
+            <a:off x="7174532" y="2857576"/>
+            <a:ext cx="3401695" cy="2142490"/>
+          </a:xfrm>
+          <a:prstGeom prst="rect">
+            <a:avLst/>
+          </a:prstGeom>
+          <a:noFill/>
+          <a:ln>
+            <a:noFill/>
+          </a:ln>
+        </p:spPr>
+      </p:pic>
+      <p:graphicFrame>
+        <p:nvGraphicFramePr>
+          <p:cNvPr id="2" name="Tabel 1">
+            <a:extLst>
+              <a:ext uri="{FF2B5EF4-FFF2-40B4-BE49-F238E27FC236}">
+                <a16:creationId xmlns:a16="http://schemas.microsoft.com/office/drawing/2014/main" id="{306A3BB3-B0B1-4FA0-9FAA-ED11FB046634}"/>
+              </a:ext>
+            </a:extLst>
+          </p:cNvPr>
+          <p:cNvGraphicFramePr>
+            <a:graphicFrameLocks noGrp="1"/>
+          </p:cNvGraphicFramePr>
+          <p:nvPr>
+            <p:extLst>
+              <p:ext uri="{D42A27DB-BD31-4B8C-83A1-F6EECF244321}">
+                <p14:modId xmlns:p14="http://schemas.microsoft.com/office/powerpoint/2010/main" val="3583363508"/>
+              </p:ext>
+            </p:extLst>
+          </p:nvPr>
+        </p:nvGraphicFramePr>
+        <p:xfrm>
+          <a:off x="985839" y="3861048"/>
+          <a:ext cx="889635" cy="684532"/>
+        </p:xfrm>
+        <a:graphic>
+          <a:graphicData uri="http://schemas.openxmlformats.org/drawingml/2006/table">
+            <a:tbl>
+              <a:tblPr firstRow="1" firstCol="1" bandRow="1">
+                <a:tableStyleId>{5C22544A-7EE6-4342-B048-85BDC9FD1C3A}</a:tableStyleId>
+              </a:tblPr>
+              <a:tblGrid>
+                <a:gridCol w="210185">
+                  <a:extLst>
+                    <a:ext uri="{9D8B030D-6E8A-4147-A177-3AD203B41FA5}">
+                      <a16:colId xmlns:a16="http://schemas.microsoft.com/office/drawing/2014/main" val="3440710067"/>
+                    </a:ext>
+                  </a:extLst>
+                </a:gridCol>
+                <a:gridCol w="210185">
+                  <a:extLst>
+                    <a:ext uri="{9D8B030D-6E8A-4147-A177-3AD203B41FA5}">
+                      <a16:colId xmlns:a16="http://schemas.microsoft.com/office/drawing/2014/main" val="3878611685"/>
+                    </a:ext>
+                  </a:extLst>
+                </a:gridCol>
+                <a:gridCol w="266065">
+                  <a:extLst>
+                    <a:ext uri="{9D8B030D-6E8A-4147-A177-3AD203B41FA5}">
+                      <a16:colId xmlns:a16="http://schemas.microsoft.com/office/drawing/2014/main" val="4181109751"/>
+                    </a:ext>
+                  </a:extLst>
+                </a:gridCol>
+                <a:gridCol w="203200">
+                  <a:extLst>
+                    <a:ext uri="{9D8B030D-6E8A-4147-A177-3AD203B41FA5}">
+                      <a16:colId xmlns:a16="http://schemas.microsoft.com/office/drawing/2014/main" val="2380166841"/>
+                    </a:ext>
+                  </a:extLst>
+                </a:gridCol>
+              </a:tblGrid>
+              <a:tr h="0">
+                <a:tc>
+                  <a:txBody>
+                    <a:bodyPr/>
+                    <a:lstStyle/>
+                    <a:p>
+                      <a:pPr>
+                        <a:lnSpc>
+                          <a:spcPct val="107000"/>
+                        </a:lnSpc>
+                        <a:spcAft>
+                          <a:spcPts val="0"/>
+                        </a:spcAft>
+                      </a:pPr>
+                      <a:r>
+                        <a:rPr lang="en-US" sz="1100">
+                          <a:effectLst/>
+                        </a:rPr>
+                        <a:t> </a:t>
+                      </a:r>
+                      <a:endParaRPr lang="da-DK" sz="1100">
+                        <a:effectLst/>
+                        <a:latin typeface="Calibri" panose="020F0502020204030204" pitchFamily="34" charset="0"/>
+                        <a:ea typeface="Calibri" panose="020F0502020204030204" pitchFamily="34" charset="0"/>
+                        <a:cs typeface="Times New Roman" panose="02020603050405020304" pitchFamily="18" charset="0"/>
+                      </a:endParaRPr>
+                    </a:p>
+                  </a:txBody>
+                  <a:tcPr marL="68580" marR="68580" marT="0" marB="0"/>
+                </a:tc>
+                <a:tc>
+                  <a:txBody>
+                    <a:bodyPr/>
+                    <a:lstStyle/>
+                    <a:p>
+                      <a:pPr>
+                        <a:lnSpc>
+                          <a:spcPct val="107000"/>
+                        </a:lnSpc>
+                        <a:spcAft>
+                          <a:spcPts val="0"/>
+                        </a:spcAft>
+                      </a:pPr>
+                      <a:r>
+                        <a:rPr lang="en-US" sz="1100">
+                          <a:effectLst/>
+                        </a:rPr>
+                        <a:t>X</a:t>
+                      </a:r>
+                      <a:endParaRPr lang="da-DK" sz="1100">
+                        <a:effectLst/>
+                        <a:latin typeface="Calibri" panose="020F0502020204030204" pitchFamily="34" charset="0"/>
+                        <a:ea typeface="Calibri" panose="020F0502020204030204" pitchFamily="34" charset="0"/>
+                        <a:cs typeface="Times New Roman" panose="02020603050405020304" pitchFamily="18" charset="0"/>
+                      </a:endParaRPr>
+                    </a:p>
+                  </a:txBody>
+                  <a:tcPr marL="68580" marR="68580" marT="0" marB="0"/>
+                </a:tc>
+                <a:tc>
+                  <a:txBody>
+                    <a:bodyPr/>
+                    <a:lstStyle/>
+                    <a:p>
+                      <a:pPr>
+                        <a:lnSpc>
+                          <a:spcPct val="107000"/>
+                        </a:lnSpc>
+                        <a:spcAft>
+                          <a:spcPts val="0"/>
+                        </a:spcAft>
+                      </a:pPr>
+                      <a:r>
+                        <a:rPr lang="en-US" sz="1100">
+                          <a:effectLst/>
+                        </a:rPr>
+                        <a:t>Y</a:t>
+                      </a:r>
+                      <a:endParaRPr lang="da-DK" sz="1100">
+                        <a:effectLst/>
+                        <a:latin typeface="Calibri" panose="020F0502020204030204" pitchFamily="34" charset="0"/>
+                        <a:ea typeface="Calibri" panose="020F0502020204030204" pitchFamily="34" charset="0"/>
+                        <a:cs typeface="Times New Roman" panose="02020603050405020304" pitchFamily="18" charset="0"/>
+                      </a:endParaRPr>
+                    </a:p>
+                  </a:txBody>
+                  <a:tcPr marL="68580" marR="68580" marT="0" marB="0"/>
+                </a:tc>
+                <a:tc>
+                  <a:txBody>
+                    <a:bodyPr/>
+                    <a:lstStyle/>
+                    <a:p>
+                      <a:pPr>
+                        <a:lnSpc>
+                          <a:spcPct val="107000"/>
+                        </a:lnSpc>
+                        <a:spcAft>
+                          <a:spcPts val="0"/>
+                        </a:spcAft>
+                      </a:pPr>
+                      <a:r>
+                        <a:rPr lang="en-US" sz="1100">
+                          <a:effectLst/>
+                        </a:rPr>
+                        <a:t>Z</a:t>
+                      </a:r>
+                      <a:endParaRPr lang="da-DK" sz="1100">
+                        <a:effectLst/>
+                        <a:latin typeface="Calibri" panose="020F0502020204030204" pitchFamily="34" charset="0"/>
+                        <a:ea typeface="Calibri" panose="020F0502020204030204" pitchFamily="34" charset="0"/>
+                        <a:cs typeface="Times New Roman" panose="02020603050405020304" pitchFamily="18" charset="0"/>
+                      </a:endParaRPr>
+                    </a:p>
+                  </a:txBody>
+                  <a:tcPr marL="68580" marR="68580" marT="0" marB="0"/>
+                </a:tc>
+                <a:extLst>
+                  <a:ext uri="{0D108BD9-81ED-4DB2-BD59-A6C34878D82A}">
+                    <a16:rowId xmlns:a16="http://schemas.microsoft.com/office/drawing/2014/main" val="3950816219"/>
+                  </a:ext>
+                </a:extLst>
+              </a:tr>
+              <a:tr h="0">
+                <a:tc>
+                  <a:txBody>
+                    <a:bodyPr/>
+                    <a:lstStyle/>
+                    <a:p>
+                      <a:pPr>
+                        <a:lnSpc>
+                          <a:spcPct val="107000"/>
+                        </a:lnSpc>
+                        <a:spcAft>
+                          <a:spcPts val="0"/>
+                        </a:spcAft>
+                      </a:pPr>
+                      <a:r>
+                        <a:rPr lang="en-US" sz="1100">
+                          <a:effectLst/>
+                        </a:rPr>
+                        <a:t>X</a:t>
+                      </a:r>
+                      <a:endParaRPr lang="da-DK" sz="1100">
+                        <a:effectLst/>
+                        <a:latin typeface="Calibri" panose="020F0502020204030204" pitchFamily="34" charset="0"/>
+                        <a:ea typeface="Calibri" panose="020F0502020204030204" pitchFamily="34" charset="0"/>
+                        <a:cs typeface="Times New Roman" panose="02020603050405020304" pitchFamily="18" charset="0"/>
+                      </a:endParaRPr>
+                    </a:p>
+                  </a:txBody>
+                  <a:tcPr marL="68580" marR="68580" marT="0" marB="0"/>
+                </a:tc>
+                <a:tc>
+                  <a:txBody>
+                    <a:bodyPr/>
+                    <a:lstStyle/>
+                    <a:p>
+                      <a:pPr>
+                        <a:lnSpc>
+                          <a:spcPct val="107000"/>
+                        </a:lnSpc>
+                        <a:spcAft>
+                          <a:spcPts val="0"/>
+                        </a:spcAft>
+                      </a:pPr>
+                      <a:r>
+                        <a:rPr lang="en-US" sz="1100">
+                          <a:effectLst/>
+                        </a:rPr>
+                        <a:t>0</a:t>
+                      </a:r>
+                      <a:endParaRPr lang="da-DK" sz="1100">
+                        <a:effectLst/>
+                        <a:latin typeface="Calibri" panose="020F0502020204030204" pitchFamily="34" charset="0"/>
+                        <a:ea typeface="Calibri" panose="020F0502020204030204" pitchFamily="34" charset="0"/>
+                        <a:cs typeface="Times New Roman" panose="02020603050405020304" pitchFamily="18" charset="0"/>
+                      </a:endParaRPr>
+                    </a:p>
+                  </a:txBody>
+                  <a:tcPr marL="68580" marR="68580" marT="0" marB="0"/>
+                </a:tc>
+                <a:tc>
+                  <a:txBody>
+                    <a:bodyPr/>
+                    <a:lstStyle/>
+                    <a:p>
+                      <a:pPr>
+                        <a:lnSpc>
+                          <a:spcPct val="107000"/>
+                        </a:lnSpc>
+                        <a:spcAft>
+                          <a:spcPts val="0"/>
+                        </a:spcAft>
+                      </a:pPr>
+                      <a:r>
+                        <a:rPr lang="en-US" sz="1100">
+                          <a:effectLst/>
+                        </a:rPr>
+                        <a:t>1</a:t>
+                      </a:r>
+                      <a:endParaRPr lang="da-DK" sz="1100">
+                        <a:effectLst/>
+                        <a:latin typeface="Calibri" panose="020F0502020204030204" pitchFamily="34" charset="0"/>
+                        <a:ea typeface="Calibri" panose="020F0502020204030204" pitchFamily="34" charset="0"/>
+                        <a:cs typeface="Times New Roman" panose="02020603050405020304" pitchFamily="18" charset="0"/>
+                      </a:endParaRPr>
+                    </a:p>
+                  </a:txBody>
+                  <a:tcPr marL="68580" marR="68580" marT="0" marB="0"/>
+                </a:tc>
+                <a:tc>
+                  <a:txBody>
+                    <a:bodyPr/>
+                    <a:lstStyle/>
+                    <a:p>
+                      <a:pPr>
+                        <a:lnSpc>
+                          <a:spcPct val="107000"/>
+                        </a:lnSpc>
+                        <a:spcAft>
+                          <a:spcPts val="0"/>
+                        </a:spcAft>
+                      </a:pPr>
+                      <a:r>
+                        <a:rPr lang="en-US" sz="1100">
+                          <a:effectLst/>
+                        </a:rPr>
+                        <a:t>5</a:t>
+                      </a:r>
+                      <a:endParaRPr lang="da-DK" sz="1100">
+                        <a:effectLst/>
+                        <a:latin typeface="Calibri" panose="020F0502020204030204" pitchFamily="34" charset="0"/>
+                        <a:ea typeface="Calibri" panose="020F0502020204030204" pitchFamily="34" charset="0"/>
+                        <a:cs typeface="Times New Roman" panose="02020603050405020304" pitchFamily="18" charset="0"/>
+                      </a:endParaRPr>
+                    </a:p>
+                  </a:txBody>
+                  <a:tcPr marL="68580" marR="68580" marT="0" marB="0"/>
+                </a:tc>
+                <a:extLst>
+                  <a:ext uri="{0D108BD9-81ED-4DB2-BD59-A6C34878D82A}">
+                    <a16:rowId xmlns:a16="http://schemas.microsoft.com/office/drawing/2014/main" val="4099088395"/>
+                  </a:ext>
+                </a:extLst>
+              </a:tr>
+              <a:tr h="0">
+                <a:tc>
+                  <a:txBody>
+                    <a:bodyPr/>
+                    <a:lstStyle/>
+                    <a:p>
+                      <a:pPr>
+                        <a:lnSpc>
+                          <a:spcPct val="107000"/>
+                        </a:lnSpc>
+                        <a:spcAft>
+                          <a:spcPts val="0"/>
+                        </a:spcAft>
+                      </a:pPr>
+                      <a:r>
+                        <a:rPr lang="en-US" sz="1100">
+                          <a:effectLst/>
+                        </a:rPr>
+                        <a:t>Y</a:t>
+                      </a:r>
+                      <a:endParaRPr lang="da-DK" sz="1100">
+                        <a:effectLst/>
+                        <a:latin typeface="Calibri" panose="020F0502020204030204" pitchFamily="34" charset="0"/>
+                        <a:ea typeface="Calibri" panose="020F0502020204030204" pitchFamily="34" charset="0"/>
+                        <a:cs typeface="Times New Roman" panose="02020603050405020304" pitchFamily="18" charset="0"/>
+                      </a:endParaRPr>
+                    </a:p>
+                  </a:txBody>
+                  <a:tcPr marL="68580" marR="68580" marT="0" marB="0"/>
+                </a:tc>
+                <a:tc>
+                  <a:txBody>
+                    <a:bodyPr/>
+                    <a:lstStyle/>
+                    <a:p>
+                      <a:pPr>
+                        <a:lnSpc>
+                          <a:spcPct val="107000"/>
+                        </a:lnSpc>
+                        <a:spcAft>
+                          <a:spcPts val="0"/>
+                        </a:spcAft>
+                      </a:pPr>
+                      <a:r>
+                        <a:rPr lang="en-US" sz="1100">
+                          <a:effectLst/>
+                        </a:rPr>
+                        <a:t> </a:t>
+                      </a:r>
+                      <a:endParaRPr lang="da-DK" sz="1100">
+                        <a:effectLst/>
+                        <a:latin typeface="Calibri" panose="020F0502020204030204" pitchFamily="34" charset="0"/>
+                        <a:ea typeface="Calibri" panose="020F0502020204030204" pitchFamily="34" charset="0"/>
+                        <a:cs typeface="Times New Roman" panose="02020603050405020304" pitchFamily="18" charset="0"/>
+                      </a:endParaRPr>
+                    </a:p>
+                  </a:txBody>
+                  <a:tcPr marL="68580" marR="68580" marT="0" marB="0"/>
+                </a:tc>
+                <a:tc>
+                  <a:txBody>
+                    <a:bodyPr/>
+                    <a:lstStyle/>
+                    <a:p>
+                      <a:pPr>
+                        <a:lnSpc>
+                          <a:spcPct val="107000"/>
+                        </a:lnSpc>
+                        <a:spcAft>
+                          <a:spcPts val="0"/>
+                        </a:spcAft>
+                      </a:pPr>
+                      <a:r>
+                        <a:rPr lang="en-US" sz="1100">
+                          <a:effectLst/>
+                        </a:rPr>
+                        <a:t> </a:t>
+                      </a:r>
+                      <a:endParaRPr lang="da-DK" sz="1100">
+                        <a:effectLst/>
+                        <a:latin typeface="Calibri" panose="020F0502020204030204" pitchFamily="34" charset="0"/>
+                        <a:ea typeface="Calibri" panose="020F0502020204030204" pitchFamily="34" charset="0"/>
+                        <a:cs typeface="Times New Roman" panose="02020603050405020304" pitchFamily="18" charset="0"/>
+                      </a:endParaRPr>
+                    </a:p>
+                  </a:txBody>
+                  <a:tcPr marL="68580" marR="68580" marT="0" marB="0"/>
+                </a:tc>
+                <a:tc>
+                  <a:txBody>
+                    <a:bodyPr/>
+                    <a:lstStyle/>
+                    <a:p>
+                      <a:pPr>
+                        <a:lnSpc>
+                          <a:spcPct val="107000"/>
+                        </a:lnSpc>
+                        <a:spcAft>
+                          <a:spcPts val="0"/>
+                        </a:spcAft>
+                      </a:pPr>
+                      <a:r>
+                        <a:rPr lang="en-US" sz="1100">
+                          <a:effectLst/>
+                        </a:rPr>
+                        <a:t> </a:t>
+                      </a:r>
+                      <a:endParaRPr lang="da-DK" sz="1100">
+                        <a:effectLst/>
+                        <a:latin typeface="Calibri" panose="020F0502020204030204" pitchFamily="34" charset="0"/>
+                        <a:ea typeface="Calibri" panose="020F0502020204030204" pitchFamily="34" charset="0"/>
+                        <a:cs typeface="Times New Roman" panose="02020603050405020304" pitchFamily="18" charset="0"/>
+                      </a:endParaRPr>
+                    </a:p>
+                  </a:txBody>
+                  <a:tcPr marL="68580" marR="68580" marT="0" marB="0"/>
+                </a:tc>
+                <a:extLst>
+                  <a:ext uri="{0D108BD9-81ED-4DB2-BD59-A6C34878D82A}">
+                    <a16:rowId xmlns:a16="http://schemas.microsoft.com/office/drawing/2014/main" val="754133819"/>
+                  </a:ext>
+                </a:extLst>
+              </a:tr>
+              <a:tr h="0">
+                <a:tc>
+                  <a:txBody>
+                    <a:bodyPr/>
+                    <a:lstStyle/>
+                    <a:p>
+                      <a:pPr>
+                        <a:lnSpc>
+                          <a:spcPct val="107000"/>
+                        </a:lnSpc>
+                        <a:spcAft>
+                          <a:spcPts val="0"/>
+                        </a:spcAft>
+                      </a:pPr>
+                      <a:r>
+                        <a:rPr lang="en-US" sz="1100">
+                          <a:effectLst/>
+                        </a:rPr>
+                        <a:t>Z</a:t>
+                      </a:r>
+                      <a:endParaRPr lang="da-DK" sz="1100">
+                        <a:effectLst/>
+                        <a:latin typeface="Calibri" panose="020F0502020204030204" pitchFamily="34" charset="0"/>
+                        <a:ea typeface="Calibri" panose="020F0502020204030204" pitchFamily="34" charset="0"/>
+                        <a:cs typeface="Times New Roman" panose="02020603050405020304" pitchFamily="18" charset="0"/>
+                      </a:endParaRPr>
+                    </a:p>
+                  </a:txBody>
+                  <a:tcPr marL="68580" marR="68580" marT="0" marB="0"/>
+                </a:tc>
+                <a:tc>
+                  <a:txBody>
+                    <a:bodyPr/>
+                    <a:lstStyle/>
+                    <a:p>
+                      <a:pPr>
+                        <a:lnSpc>
+                          <a:spcPct val="107000"/>
+                        </a:lnSpc>
+                        <a:spcAft>
+                          <a:spcPts val="0"/>
+                        </a:spcAft>
+                      </a:pPr>
+                      <a:r>
+                        <a:rPr lang="en-US" sz="1100">
+                          <a:effectLst/>
+                        </a:rPr>
+                        <a:t> </a:t>
+                      </a:r>
+                      <a:endParaRPr lang="da-DK" sz="1100">
+                        <a:effectLst/>
+                        <a:latin typeface="Calibri" panose="020F0502020204030204" pitchFamily="34" charset="0"/>
+                        <a:ea typeface="Calibri" panose="020F0502020204030204" pitchFamily="34" charset="0"/>
+                        <a:cs typeface="Times New Roman" panose="02020603050405020304" pitchFamily="18" charset="0"/>
+                      </a:endParaRPr>
+                    </a:p>
+                  </a:txBody>
+                  <a:tcPr marL="68580" marR="68580" marT="0" marB="0"/>
+                </a:tc>
+                <a:tc>
+                  <a:txBody>
+                    <a:bodyPr/>
+                    <a:lstStyle/>
+                    <a:p>
+                      <a:pPr>
+                        <a:lnSpc>
+                          <a:spcPct val="107000"/>
+                        </a:lnSpc>
+                        <a:spcAft>
+                          <a:spcPts val="0"/>
+                        </a:spcAft>
+                      </a:pPr>
+                      <a:r>
+                        <a:rPr lang="en-US" sz="1100">
+                          <a:effectLst/>
+                        </a:rPr>
+                        <a:t> </a:t>
+                      </a:r>
+                      <a:endParaRPr lang="da-DK" sz="1100">
+                        <a:effectLst/>
+                        <a:latin typeface="Calibri" panose="020F0502020204030204" pitchFamily="34" charset="0"/>
+                        <a:ea typeface="Calibri" panose="020F0502020204030204" pitchFamily="34" charset="0"/>
+                        <a:cs typeface="Times New Roman" panose="02020603050405020304" pitchFamily="18" charset="0"/>
+                      </a:endParaRPr>
+                    </a:p>
+                  </a:txBody>
+                  <a:tcPr marL="68580" marR="68580" marT="0" marB="0"/>
+                </a:tc>
+                <a:tc>
+                  <a:txBody>
+                    <a:bodyPr/>
+                    <a:lstStyle/>
+                    <a:p>
+                      <a:pPr>
+                        <a:lnSpc>
+                          <a:spcPct val="107000"/>
+                        </a:lnSpc>
+                        <a:spcAft>
+                          <a:spcPts val="0"/>
+                        </a:spcAft>
+                      </a:pPr>
+                      <a:r>
+                        <a:rPr lang="en-US" sz="1100" dirty="0">
+                          <a:effectLst/>
+                        </a:rPr>
+                        <a:t> </a:t>
+                      </a:r>
+                      <a:endParaRPr lang="da-DK" sz="1100" dirty="0">
+                        <a:effectLst/>
+                        <a:latin typeface="Calibri" panose="020F0502020204030204" pitchFamily="34" charset="0"/>
+                        <a:ea typeface="Calibri" panose="020F0502020204030204" pitchFamily="34" charset="0"/>
+                        <a:cs typeface="Times New Roman" panose="02020603050405020304" pitchFamily="18" charset="0"/>
+                      </a:endParaRPr>
+                    </a:p>
+                  </a:txBody>
+                  <a:tcPr marL="68580" marR="68580" marT="0" marB="0"/>
+                </a:tc>
+                <a:extLst>
+                  <a:ext uri="{0D108BD9-81ED-4DB2-BD59-A6C34878D82A}">
+                    <a16:rowId xmlns:a16="http://schemas.microsoft.com/office/drawing/2014/main" val="22921830"/>
+                  </a:ext>
+                </a:extLst>
+              </a:tr>
+            </a:tbl>
+          </a:graphicData>
+        </a:graphic>
+      </p:graphicFrame>
     </p:spTree>
     <p:custDataLst>
       <p:tags r:id="rId1"/>
@@ -9589,6 +10237,47 @@
           <a:bodyPr/>
           <a:lstStyle/>
           <a:p>
+            <a:r>
+              <a:rPr lang="en-US" dirty="0"/>
+              <a:t>•in RIP every router that participates in routing sends an update message to all its neighbors once every 30 seconds.</a:t>
+            </a:r>
+          </a:p>
+          <a:p>
+            <a:endParaRPr lang="en-US" dirty="0"/>
+          </a:p>
+          <a:p>
+            <a:r>
+              <a:rPr lang="en-US" dirty="0"/>
+              <a:t>•If a node crashes or a connection is lost to a node an update message will not be sent, and the neighboring node will timeout the connection to the crashed node(180s)</a:t>
+            </a:r>
+          </a:p>
+          <a:p>
+            <a:endParaRPr lang="en-US" dirty="0"/>
+          </a:p>
+          <a:p>
+            <a:r>
+              <a:rPr lang="en-US" dirty="0"/>
+              <a:t>•Routing table will be updated and the metric to the crashed node will be </a:t>
+            </a:r>
+            <a:r>
+              <a:rPr lang="en-US" dirty="0" err="1"/>
+              <a:t>inf</a:t>
+            </a:r>
+            <a:endParaRPr lang="en-US" dirty="0"/>
+          </a:p>
+          <a:p>
+            <a:endParaRPr lang="en-US" dirty="0"/>
+          </a:p>
+          <a:p>
+            <a:r>
+              <a:rPr lang="en-US" dirty="0"/>
+              <a:t>•Messages could be lost with this implementation</a:t>
+            </a:r>
+          </a:p>
+          <a:p>
+            <a:endParaRPr lang="en-US" dirty="0"/>
+          </a:p>
+          <a:p>
             <a:endParaRPr lang="da-DK" dirty="0"/>
           </a:p>
         </p:txBody>
@@ -10279,7 +10968,7 @@
           <a:p>
             <a:fld id="{4E971463-9D11-49C6-990F-A7A6F49DDE03}" type="datetime1">
               <a:rPr lang="da-DK" smtClean="0"/>
-              <a:t>04-10-2018</a:t>
+              <a:t>05-10-2018</a:t>
             </a:fld>
             <a:r>
               <a:rPr lang="da-DK"/>

</xml_diff>